<commit_message>
Added encoding efficiency example.
</commit_message>
<xml_diff>
--- a/PythonProtobufPyOhio2017.pptx
+++ b/PythonProtobufPyOhio2017.pptx
@@ -5,10 +5,10 @@
     <p:sldMasterId id="2147483924" r:id="rId2"/>
   </p:sldMasterIdLst>
   <p:notesMasterIdLst>
-    <p:notesMasterId r:id="rId20"/>
+    <p:notesMasterId r:id="rId21"/>
   </p:notesMasterIdLst>
   <p:handoutMasterIdLst>
-    <p:handoutMasterId r:id="rId21"/>
+    <p:handoutMasterId r:id="rId22"/>
   </p:handoutMasterIdLst>
   <p:sldIdLst>
     <p:sldId id="268" r:id="rId3"/>
@@ -28,6 +28,7 @@
     <p:sldId id="286" r:id="rId17"/>
     <p:sldId id="284" r:id="rId18"/>
     <p:sldId id="287" r:id="rId19"/>
+    <p:sldId id="288" r:id="rId20"/>
   </p:sldIdLst>
   <p:sldSz cx="12188825" cy="6858000"/>
   <p:notesSz cx="6858000" cy="9144000"/>
@@ -6690,7 +6691,7 @@
           <a:lstStyle/>
           <a:p>
             <a:pPr algn="ctr"/>
-            <a:endParaRPr lang="en-US"/>
+            <a:endParaRPr lang="en-US" dirty="0"/>
           </a:p>
         </p:txBody>
       </p:sp>
@@ -6749,6 +6750,149 @@
     <p:extLst>
       <p:ext uri="{BB962C8B-B14F-4D97-AF65-F5344CB8AC3E}">
         <p14:creationId xmlns:p14="http://schemas.microsoft.com/office/powerpoint/2010/main" val="2220824841"/>
+      </p:ext>
+    </p:extLst>
+  </p:cSld>
+  <p:clrMapOvr>
+    <a:masterClrMapping/>
+  </p:clrMapOvr>
+  <mc:AlternateContent xmlns:mc="http://schemas.openxmlformats.org/markup-compatibility/2006" xmlns:p14="http://schemas.microsoft.com/office/powerpoint/2010/main">
+    <mc:Choice Requires="p14">
+      <p:transition spd="med" p14:dur="700">
+        <p:fade/>
+      </p:transition>
+    </mc:Choice>
+    <mc:Fallback xmlns="">
+      <p:transition spd="med">
+        <p:fade/>
+      </p:transition>
+    </mc:Fallback>
+  </mc:AlternateContent>
+</p:sld>
+</file>
+
+<file path=ppt/slides/slide18.xml><?xml version="1.0" encoding="utf-8"?>
+<p:sld xmlns:a="http://schemas.openxmlformats.org/drawingml/2006/main" xmlns:r="http://schemas.openxmlformats.org/officeDocument/2006/relationships" xmlns:p="http://schemas.openxmlformats.org/presentationml/2006/main">
+  <p:cSld>
+    <p:spTree>
+      <p:nvGrpSpPr>
+        <p:cNvPr id="1" name=""/>
+        <p:cNvGrpSpPr/>
+        <p:nvPr/>
+      </p:nvGrpSpPr>
+      <p:grpSpPr>
+        <a:xfrm>
+          <a:off x="0" y="0"/>
+          <a:ext cx="0" cy="0"/>
+          <a:chOff x="0" y="0"/>
+          <a:chExt cx="0" cy="0"/>
+        </a:xfrm>
+      </p:grpSpPr>
+      <p:sp>
+        <p:nvSpPr>
+          <p:cNvPr id="2" name="Content Placeholder 1"/>
+          <p:cNvSpPr>
+            <a:spLocks noGrp="1"/>
+          </p:cNvSpPr>
+          <p:nvPr>
+            <p:ph idx="1"/>
+          </p:nvPr>
+        </p:nvSpPr>
+        <p:spPr/>
+        <p:txBody>
+          <a:bodyPr>
+            <a:normAutofit/>
+          </a:bodyPr>
+          <a:lstStyle/>
+          <a:p>
+            <a:pPr marL="0" indent="0">
+              <a:buNone/>
+            </a:pPr>
+            <a:r>
+              <a:rPr lang="en-US" dirty="0" err="1"/>
+              <a:t>Protobuf</a:t>
+            </a:r>
+            <a:r>
+              <a:rPr lang="en-US" dirty="0"/>
+              <a:t> </a:t>
+            </a:r>
+            <a:r>
+              <a:rPr lang="en-US" dirty="0" err="1"/>
+              <a:t>Github</a:t>
+            </a:r>
+            <a:r>
+              <a:rPr lang="en-US" dirty="0"/>
+              <a:t>: </a:t>
+            </a:r>
+            <a:r>
+              <a:rPr lang="en-US" dirty="0">
+                <a:hlinkClick r:id="rId2"/>
+              </a:rPr>
+              <a:t>https://github.com/google/protobuf</a:t>
+            </a:r>
+            <a:endParaRPr lang="en-US" dirty="0"/>
+          </a:p>
+          <a:p>
+            <a:pPr marL="0" indent="0">
+              <a:buNone/>
+            </a:pPr>
+            <a:r>
+              <a:rPr lang="en-US" dirty="0"/>
+              <a:t>Code &amp; Slides: </a:t>
+            </a:r>
+            <a:r>
+              <a:rPr lang="en-US" dirty="0">
+                <a:hlinkClick r:id="rId3"/>
+              </a:rPr>
+              <a:t>https://github.com/kerchen/PyOhioProtobuf</a:t>
+            </a:r>
+            <a:endParaRPr lang="en-US" dirty="0"/>
+          </a:p>
+          <a:p>
+            <a:pPr marL="0" indent="0">
+              <a:buNone/>
+            </a:pPr>
+            <a:r>
+              <a:rPr lang="en-US" dirty="0"/>
+              <a:t>Contact Paul </a:t>
+            </a:r>
+            <a:r>
+              <a:rPr lang="en-US" dirty="0" err="1"/>
+              <a:t>Kerchen</a:t>
+            </a:r>
+            <a:r>
+              <a:rPr lang="en-US" dirty="0"/>
+              <a:t>: paul@whirlingchair.com</a:t>
+            </a:r>
+          </a:p>
+        </p:txBody>
+      </p:sp>
+      <p:sp>
+        <p:nvSpPr>
+          <p:cNvPr id="3" name="Title 2"/>
+          <p:cNvSpPr>
+            <a:spLocks noGrp="1"/>
+          </p:cNvSpPr>
+          <p:nvPr>
+            <p:ph type="title"/>
+          </p:nvPr>
+        </p:nvSpPr>
+        <p:spPr/>
+        <p:txBody>
+          <a:bodyPr/>
+          <a:lstStyle/>
+          <a:p>
+            <a:r>
+              <a:rPr lang="en-US" dirty="0"/>
+              <a:t>Links &amp; Resources</a:t>
+            </a:r>
+          </a:p>
+        </p:txBody>
+      </p:sp>
+    </p:spTree>
+    <p:extLst>
+      <p:ext uri="{BB962C8B-B14F-4D97-AF65-F5344CB8AC3E}">
+        <p14:creationId xmlns:p14="http://schemas.microsoft.com/office/powerpoint/2010/main" val="3024654720"/>
       </p:ext>
     </p:extLst>
   </p:cSld>
@@ -6945,6 +7089,12 @@
             </a:r>
           </a:p>
           <a:p>
+            <a:r>
+              <a:rPr lang="en-US" dirty="0"/>
+              <a:t>Not designed for large (&gt; 1MB) data sets</a:t>
+            </a:r>
+          </a:p>
+          <a:p>
             <a:endParaRPr lang="en-US" dirty="0"/>
           </a:p>
           <a:p>
@@ -7062,13 +7212,6 @@
             </a:r>
           </a:p>
           <a:p>
-            <a:pPr lvl="1"/>
-            <a:r>
-              <a:rPr lang="en-US" dirty="0"/>
-              <a:t>Presentation examples use proto3</a:t>
-            </a:r>
-          </a:p>
-          <a:p>
             <a:r>
               <a:rPr lang="en-US" dirty="0"/>
               <a:t>Proto2 support to continue “for a long time”</a:t>
@@ -7078,11 +7221,7 @@
             <a:pPr lvl="1"/>
             <a:r>
               <a:rPr lang="en-US" dirty="0"/>
-              <a:t>Used in demo code due to dependence on </a:t>
-            </a:r>
-            <a:r>
-              <a:rPr lang="en-US" b="1" dirty="0" err="1"/>
-              <a:t>nanopb</a:t>
+              <a:t>Don’t use it, even though a lot of the docs still have examples in it!</a:t>
             </a:r>
             <a:endParaRPr lang="en-US" b="1" dirty="0"/>
           </a:p>

</xml_diff>

<commit_message>
Added efficiency and conclusion slides
</commit_message>
<xml_diff>
--- a/PythonProtobufPyOhio2017.pptx
+++ b/PythonProtobufPyOhio2017.pptx
@@ -257,7 +257,7 @@
           <a:p>
             <a:fld id="{BEA74EB7-856E-45FD-83F0-5F7C6F3E4372}" type="datetimeFigureOut">
               <a:rPr lang="en-US"/>
-              <a:t>7/22/2017</a:t>
+              <a:t>2017-07-26</a:t>
             </a:fld>
             <a:endParaRPr dirty="0"/>
           </a:p>
@@ -422,7 +422,7 @@
           <a:p>
             <a:fld id="{C61B0E40-8125-41F8-BB6C-139D8D531A4F}" type="datetimeFigureOut">
               <a:rPr lang="en-US"/>
-              <a:t>7/22/2017</a:t>
+              <a:t>2017-07-26</a:t>
             </a:fld>
             <a:endParaRPr dirty="0"/>
           </a:p>
@@ -1253,7 +1253,7 @@
           <a:p>
             <a:fld id="{333B76B7-5811-4114-8A95-998148FFD529}" type="datetime1">
               <a:rPr lang="en-US" smtClean="0"/>
-              <a:t>7/22/2017</a:t>
+              <a:t>2017-07-26</a:t>
             </a:fld>
             <a:endParaRPr lang="en-US" dirty="0"/>
           </a:p>
@@ -1532,7 +1532,7 @@
           <a:p>
             <a:fld id="{175C077A-EF7A-41AA-8976-110EB7416C60}" type="datetime1">
               <a:rPr lang="en-US" smtClean="0"/>
-              <a:t>7/22/2017</a:t>
+              <a:t>2017-07-26</a:t>
             </a:fld>
             <a:endParaRPr lang="en-US" dirty="0"/>
           </a:p>
@@ -1731,7 +1731,7 @@
           <a:p>
             <a:fld id="{CFF5912B-6681-4BDF-AE10-F59636249FF3}" type="datetime1">
               <a:rPr lang="en-US" smtClean="0"/>
-              <a:t>7/22/2017</a:t>
+              <a:t>2017-07-26</a:t>
             </a:fld>
             <a:endParaRPr lang="en-US" dirty="0"/>
           </a:p>
@@ -1940,7 +1940,7 @@
           <a:p>
             <a:fld id="{905C8E22-D0BA-4CB4-9C32-B27533199514}" type="datetime1">
               <a:rPr lang="en-US" smtClean="0"/>
-              <a:t>7/22/2017</a:t>
+              <a:t>2017-07-26</a:t>
             </a:fld>
             <a:endParaRPr dirty="0"/>
           </a:p>
@@ -2129,7 +2129,7 @@
           <a:p>
             <a:fld id="{FC2180A9-7A83-412D-A8AC-5AF60A8AA507}" type="datetime1">
               <a:rPr lang="en-US" smtClean="0"/>
-              <a:t>7/22/2017</a:t>
+              <a:t>2017-07-26</a:t>
             </a:fld>
             <a:endParaRPr lang="en-US" dirty="0"/>
           </a:p>
@@ -2326,7 +2326,7 @@
           <a:p>
             <a:fld id="{6A563DF0-FDDF-4143-9D8C-6AF41892E174}" type="datetime1">
               <a:rPr lang="en-US" smtClean="0"/>
-              <a:t>7/22/2017</a:t>
+              <a:t>2017-07-26</a:t>
             </a:fld>
             <a:endParaRPr lang="en-US" dirty="0"/>
           </a:p>
@@ -2606,7 +2606,7 @@
           <a:p>
             <a:fld id="{38BB83F9-4677-4C31-8407-7919061A580B}" type="datetime1">
               <a:rPr lang="en-US" smtClean="0"/>
-              <a:t>7/22/2017</a:t>
+              <a:t>2017-07-26</a:t>
             </a:fld>
             <a:endParaRPr lang="en-US" dirty="0"/>
           </a:p>
@@ -2911,7 +2911,7 @@
           <a:p>
             <a:fld id="{C33939A6-3450-434F-A872-BEE63F7EB093}" type="datetime1">
               <a:rPr lang="en-US" smtClean="0"/>
-              <a:t>7/22/2017</a:t>
+              <a:t>2017-07-26</a:t>
             </a:fld>
             <a:endParaRPr lang="en-US" dirty="0"/>
           </a:p>
@@ -3360,7 +3360,7 @@
           <a:p>
             <a:fld id="{E3BABB1C-FA00-4171-BA31-4C5E719472F3}" type="datetime1">
               <a:rPr lang="en-US" smtClean="0"/>
-              <a:t>7/22/2017</a:t>
+              <a:t>2017-07-26</a:t>
             </a:fld>
             <a:endParaRPr lang="en-US" dirty="0"/>
           </a:p>
@@ -3641,7 +3641,7 @@
           <a:p>
             <a:fld id="{D76C8610-5B57-4C6B-BF9F-F5397A1F60B8}" type="datetime1">
               <a:rPr lang="en-US" smtClean="0"/>
-              <a:t>7/22/2017</a:t>
+              <a:t>2017-07-26</a:t>
             </a:fld>
             <a:endParaRPr lang="en-US" dirty="0"/>
           </a:p>
@@ -3796,7 +3796,7 @@
           <a:p>
             <a:fld id="{BADBF3DD-8B6D-46AA-BCA9-242D4EF63DDF}" type="datetime1">
               <a:rPr lang="en-US" smtClean="0"/>
-              <a:t>7/22/2017</a:t>
+              <a:t>2017-07-26</a:t>
             </a:fld>
             <a:endParaRPr lang="en-US" dirty="0"/>
           </a:p>
@@ -4142,7 +4142,7 @@
           <a:p>
             <a:fld id="{23C41AE9-3D4A-4A08-B03D-DC6D2ADF5464}" type="datetime1">
               <a:rPr lang="en-US" smtClean="0"/>
-              <a:t>7/22/2017</a:t>
+              <a:t>2017-07-26</a:t>
             </a:fld>
             <a:endParaRPr lang="en-US" dirty="0"/>
           </a:p>
@@ -4815,7 +4815,7 @@
           <a:p>
             <a:fld id="{5C6E67D0-0200-42BE-A0B2-78C70FBBB312}" type="datetime1">
               <a:rPr lang="en-US" smtClean="0"/>
-              <a:t>7/22/2017</a:t>
+              <a:t>2017-07-26</a:t>
             </a:fld>
             <a:endParaRPr lang="en-US" dirty="0"/>
           </a:p>
@@ -5443,6 +5443,13 @@
       </p:transition>
     </mc:Fallback>
   </mc:AlternateContent>
+  <p:timing>
+    <p:tnLst>
+      <p:par>
+        <p:cTn id="1" dur="indefinite" restart="never" nodeType="tmRoot"/>
+      </p:par>
+    </p:tnLst>
+  </p:timing>
 </p:sld>
 </file>
 
@@ -6170,7 +6177,7 @@
           <p:cNvPr id="7" name="Picture 6">
             <a:extLst>
               <a:ext uri="{FF2B5EF4-FFF2-40B4-BE49-F238E27FC236}">
-                <a16:creationId xmlns:a16="http://schemas.microsoft.com/office/drawing/2014/main" id="{261AA85A-88AE-4A20-97E2-189C6A0B7B67}"/>
+                <a16:creationId xmlns:a16="http://schemas.microsoft.com/office/drawing/2014/main" xmlns="" id="{261AA85A-88AE-4A20-97E2-189C6A0B7B67}"/>
               </a:ext>
             </a:extLst>
           </p:cNvPr>
@@ -6206,7 +6213,7 @@
           <p:cNvPr id="8" name="TextBox 7">
             <a:extLst>
               <a:ext uri="{FF2B5EF4-FFF2-40B4-BE49-F238E27FC236}">
-                <a16:creationId xmlns:a16="http://schemas.microsoft.com/office/drawing/2014/main" id="{A1A26C15-9E35-415D-8D27-B7EF0E7623C7}"/>
+                <a16:creationId xmlns:a16="http://schemas.microsoft.com/office/drawing/2014/main" xmlns="" id="{A1A26C15-9E35-415D-8D27-B7EF0E7623C7}"/>
               </a:ext>
             </a:extLst>
           </p:cNvPr>
@@ -6439,9 +6446,65 @@
           </a:bodyPr>
           <a:lstStyle/>
           <a:p>
-            <a:pPr marL="0" indent="0">
-              <a:buNone/>
-            </a:pPr>
+            <a:r>
+              <a:rPr lang="en-US" dirty="0" smtClean="0"/>
+              <a:t>For integers: </a:t>
+            </a:r>
+            <a:r>
+              <a:rPr lang="en-US" b="1" dirty="0" err="1" smtClean="0"/>
+              <a:t>varints</a:t>
+            </a:r>
+            <a:r>
+              <a:rPr lang="en-US" dirty="0"/>
+              <a:t> </a:t>
+            </a:r>
+            <a:r>
+              <a:rPr lang="en-US" dirty="0" smtClean="0"/>
+              <a:t>and </a:t>
+            </a:r>
+            <a:r>
+              <a:rPr lang="en-US" dirty="0" err="1" smtClean="0"/>
+              <a:t>ZigZag</a:t>
+            </a:r>
+            <a:r>
+              <a:rPr lang="en-US" dirty="0" smtClean="0"/>
+              <a:t> encoding</a:t>
+            </a:r>
+          </a:p>
+          <a:p>
+            <a:pPr lvl="1"/>
+            <a:r>
+              <a:rPr lang="en-US" dirty="0" smtClean="0"/>
+              <a:t>Smaller values -&gt; shorter encoding</a:t>
+            </a:r>
+          </a:p>
+          <a:p>
+            <a:r>
+              <a:rPr lang="en-US" dirty="0" smtClean="0"/>
+              <a:t>Select data type based on expected value ranges</a:t>
+            </a:r>
+          </a:p>
+          <a:p>
+            <a:pPr lvl="1"/>
+            <a:r>
+              <a:rPr lang="en-US" dirty="0" smtClean="0"/>
+              <a:t>Using int32 or int64 for negative values is very inefficient—10 bytes each!</a:t>
+            </a:r>
+          </a:p>
+          <a:p>
+            <a:pPr lvl="1"/>
+            <a:r>
+              <a:rPr lang="en-US" dirty="0" smtClean="0"/>
+              <a:t>double &amp; fixed64 always 8 bytes; float &amp; fixed32 always 4 bytes</a:t>
+            </a:r>
+          </a:p>
+          <a:p>
+            <a:r>
+              <a:rPr lang="en-US" dirty="0" smtClean="0"/>
+              <a:t>Frequently-used fields should have lower tags (magic numbers: 15, 2047)</a:t>
+            </a:r>
+          </a:p>
+          <a:p>
             <a:endParaRPr lang="en-US" dirty="0"/>
           </a:p>
         </p:txBody>
@@ -6537,7 +6600,7 @@
           <p:cNvPr id="7" name="Picture 6">
             <a:extLst>
               <a:ext uri="{FF2B5EF4-FFF2-40B4-BE49-F238E27FC236}">
-                <a16:creationId xmlns:a16="http://schemas.microsoft.com/office/drawing/2014/main" id="{261AA85A-88AE-4A20-97E2-189C6A0B7B67}"/>
+                <a16:creationId xmlns:a16="http://schemas.microsoft.com/office/drawing/2014/main" xmlns="" id="{261AA85A-88AE-4A20-97E2-189C6A0B7B67}"/>
               </a:ext>
             </a:extLst>
           </p:cNvPr>
@@ -6573,7 +6636,7 @@
           <p:cNvPr id="4" name="Picture 3">
             <a:extLst>
               <a:ext uri="{FF2B5EF4-FFF2-40B4-BE49-F238E27FC236}">
-                <a16:creationId xmlns:a16="http://schemas.microsoft.com/office/drawing/2014/main" id="{FE7388A0-34A7-45DC-B5CF-067B0C42219E}"/>
+                <a16:creationId xmlns:a16="http://schemas.microsoft.com/office/drawing/2014/main" xmlns="" id="{FE7388A0-34A7-45DC-B5CF-067B0C42219E}"/>
               </a:ext>
             </a:extLst>
           </p:cNvPr>
@@ -6626,6 +6689,13 @@
       </p:transition>
     </mc:Fallback>
   </mc:AlternateContent>
+  <p:timing>
+    <p:tnLst>
+      <p:par>
+        <p:cTn id="1" dur="indefinite" restart="never" nodeType="tmRoot"/>
+      </p:par>
+    </p:tnLst>
+  </p:timing>
 </p:sld>
 </file>
 
@@ -6648,30 +6718,6 @@
       </p:grpSpPr>
       <p:sp>
         <p:nvSpPr>
-          <p:cNvPr id="2" name="Content Placeholder 1"/>
-          <p:cNvSpPr>
-            <a:spLocks noGrp="1"/>
-          </p:cNvSpPr>
-          <p:nvPr>
-            <p:ph idx="1"/>
-          </p:nvPr>
-        </p:nvSpPr>
-        <p:spPr/>
-        <p:txBody>
-          <a:bodyPr>
-            <a:normAutofit/>
-          </a:bodyPr>
-          <a:lstStyle/>
-          <a:p>
-            <a:pPr marL="0" indent="0">
-              <a:buNone/>
-            </a:pPr>
-            <a:endParaRPr lang="en-US" dirty="0"/>
-          </a:p>
-        </p:txBody>
-      </p:sp>
-      <p:sp>
-        <p:nvSpPr>
           <p:cNvPr id="3" name="Title 2"/>
           <p:cNvSpPr>
             <a:spLocks noGrp="1"/>
@@ -6697,7 +6743,7 @@
           <p:cNvPr id="6" name="Oval 5">
             <a:extLst>
               <a:ext uri="{FF2B5EF4-FFF2-40B4-BE49-F238E27FC236}">
-                <a16:creationId xmlns:a16="http://schemas.microsoft.com/office/drawing/2014/main" id="{A22E9DF9-EA6B-454A-A2C3-876ACEDB20B5}"/>
+                <a16:creationId xmlns:a16="http://schemas.microsoft.com/office/drawing/2014/main" xmlns="" id="{A22E9DF9-EA6B-454A-A2C3-876ACEDB20B5}"/>
               </a:ext>
             </a:extLst>
           </p:cNvPr>
@@ -6706,14 +6752,14 @@
         </p:nvSpPr>
         <p:spPr>
           <a:xfrm>
-            <a:off x="3579812" y="2420232"/>
+            <a:off x="3694112" y="1876768"/>
             <a:ext cx="2667000" cy="2667000"/>
           </a:xfrm>
           <a:prstGeom prst="ellipse">
             <a:avLst/>
           </a:prstGeom>
           <a:solidFill>
-            <a:srgbClr val="E2E482">
+            <a:srgbClr val="FFC000">
               <a:alpha val="50196"/>
             </a:srgbClr>
           </a:solidFill>
@@ -6748,7 +6794,7 @@
           <p:cNvPr id="8" name="Oval 7">
             <a:extLst>
               <a:ext uri="{FF2B5EF4-FFF2-40B4-BE49-F238E27FC236}">
-                <a16:creationId xmlns:a16="http://schemas.microsoft.com/office/drawing/2014/main" id="{CCE74306-C872-4285-9479-6E82205013FB}"/>
+                <a16:creationId xmlns:a16="http://schemas.microsoft.com/office/drawing/2014/main" xmlns="" id="{CCE74306-C872-4285-9479-6E82205013FB}"/>
               </a:ext>
             </a:extLst>
           </p:cNvPr>
@@ -6757,14 +6803,99 @@
         </p:nvSpPr>
         <p:spPr>
           <a:xfrm>
-            <a:off x="5256212" y="2344032"/>
+            <a:off x="4989512" y="1810631"/>
             <a:ext cx="2743200" cy="2743200"/>
           </a:xfrm>
           <a:prstGeom prst="ellipse">
             <a:avLst/>
           </a:prstGeom>
           <a:solidFill>
-            <a:srgbClr val="7EE8A6">
+            <a:schemeClr val="accent2">
+              <a:lumMod val="75000"/>
+              <a:alpha val="50196"/>
+            </a:schemeClr>
+          </a:solidFill>
+        </p:spPr>
+        <p:style>
+          <a:lnRef idx="2">
+            <a:schemeClr val="accent1">
+              <a:shade val="50000"/>
+            </a:schemeClr>
+          </a:lnRef>
+          <a:fillRef idx="1">
+            <a:schemeClr val="accent1"/>
+          </a:fillRef>
+          <a:effectRef idx="0">
+            <a:schemeClr val="accent1"/>
+          </a:effectRef>
+          <a:fontRef idx="minor">
+            <a:schemeClr val="lt1"/>
+          </a:fontRef>
+        </p:style>
+        <p:txBody>
+          <a:bodyPr rtlCol="0" anchor="ctr"/>
+          <a:lstStyle/>
+          <a:p>
+            <a:pPr algn="ctr"/>
+            <a:endParaRPr lang="en-US"/>
+          </a:p>
+        </p:txBody>
+      </p:sp>
+      <p:sp>
+        <p:nvSpPr>
+          <p:cNvPr id="4" name="TextBox 3"/>
+          <p:cNvSpPr txBox="1"/>
+          <p:nvPr/>
+        </p:nvSpPr>
+        <p:spPr>
+          <a:xfrm>
+            <a:off x="3642222" y="2812899"/>
+            <a:ext cx="1365650" cy="369332"/>
+          </a:xfrm>
+          <a:prstGeom prst="rect">
+            <a:avLst/>
+          </a:prstGeom>
+          <a:noFill/>
+          <a:ln>
+            <a:noFill/>
+          </a:ln>
+        </p:spPr>
+        <p:txBody>
+          <a:bodyPr wrap="square" rtlCol="0" anchor="ctr" anchorCtr="1">
+            <a:spAutoFit/>
+          </a:bodyPr>
+          <a:lstStyle/>
+          <a:p>
+            <a:pPr algn="ctr"/>
+            <a:r>
+              <a:rPr lang="en-US" dirty="0" smtClean="0"/>
+              <a:t>What I Said</a:t>
+            </a:r>
+          </a:p>
+        </p:txBody>
+      </p:sp>
+      <p:sp>
+        <p:nvSpPr>
+          <p:cNvPr id="9" name="Oval 8">
+            <a:extLst>
+              <a:ext uri="{FF2B5EF4-FFF2-40B4-BE49-F238E27FC236}">
+                <a16:creationId xmlns:a16="http://schemas.microsoft.com/office/drawing/2014/main" xmlns="" id="{A22E9DF9-EA6B-454A-A2C3-876ACEDB20B5}"/>
+              </a:ext>
+            </a:extLst>
+          </p:cNvPr>
+          <p:cNvSpPr/>
+          <p:nvPr/>
+        </p:nvSpPr>
+        <p:spPr>
+          <a:xfrm>
+            <a:off x="4336365" y="2868743"/>
+            <a:ext cx="2667000" cy="2667000"/>
+          </a:xfrm>
+          <a:prstGeom prst="ellipse">
+            <a:avLst/>
+          </a:prstGeom>
+          <a:solidFill>
+            <a:srgbClr val="7030A0">
               <a:alpha val="50196"/>
             </a:srgbClr>
           </a:solidFill>
@@ -6790,7 +6921,267 @@
           <a:lstStyle/>
           <a:p>
             <a:pPr algn="ctr"/>
-            <a:endParaRPr lang="en-US"/>
+            <a:endParaRPr lang="en-US" dirty="0"/>
+          </a:p>
+        </p:txBody>
+      </p:sp>
+      <p:sp>
+        <p:nvSpPr>
+          <p:cNvPr id="5" name="TextBox 4"/>
+          <p:cNvSpPr txBox="1"/>
+          <p:nvPr/>
+        </p:nvSpPr>
+        <p:spPr>
+          <a:xfrm>
+            <a:off x="4762116" y="4712458"/>
+            <a:ext cx="1826392" cy="369332"/>
+          </a:xfrm>
+          <a:prstGeom prst="rect">
+            <a:avLst/>
+          </a:prstGeom>
+          <a:noFill/>
+          <a:ln>
+            <a:noFill/>
+          </a:ln>
+        </p:spPr>
+        <p:txBody>
+          <a:bodyPr wrap="square" rtlCol="0" anchor="ctr" anchorCtr="1">
+            <a:spAutoFit/>
+          </a:bodyPr>
+          <a:lstStyle/>
+          <a:p>
+            <a:pPr algn="ctr"/>
+            <a:r>
+              <a:rPr lang="en-US" dirty="0" smtClean="0"/>
+              <a:t>What I Meant</a:t>
+            </a:r>
+            <a:endParaRPr lang="en-US" dirty="0" smtClean="0"/>
+          </a:p>
+        </p:txBody>
+      </p:sp>
+      <p:sp>
+        <p:nvSpPr>
+          <p:cNvPr id="10" name="TextBox 9"/>
+          <p:cNvSpPr txBox="1"/>
+          <p:nvPr/>
+        </p:nvSpPr>
+        <p:spPr>
+          <a:xfrm>
+            <a:off x="6166462" y="2552053"/>
+            <a:ext cx="1541940" cy="646331"/>
+          </a:xfrm>
+          <a:prstGeom prst="rect">
+            <a:avLst/>
+          </a:prstGeom>
+          <a:noFill/>
+          <a:ln>
+            <a:noFill/>
+          </a:ln>
+        </p:spPr>
+        <p:txBody>
+          <a:bodyPr wrap="square" rtlCol="0" anchor="ctr" anchorCtr="1">
+            <a:spAutoFit/>
+          </a:bodyPr>
+          <a:lstStyle/>
+          <a:p>
+            <a:pPr algn="ctr"/>
+            <a:r>
+              <a:rPr lang="en-US" dirty="0" smtClean="0"/>
+              <a:t>What You Learned</a:t>
+            </a:r>
+            <a:endParaRPr lang="en-US" dirty="0" smtClean="0"/>
+          </a:p>
+        </p:txBody>
+      </p:sp>
+      <p:sp>
+        <p:nvSpPr>
+          <p:cNvPr id="12" name="TextBox 11"/>
+          <p:cNvSpPr txBox="1"/>
+          <p:nvPr/>
+        </p:nvSpPr>
+        <p:spPr>
+          <a:xfrm>
+            <a:off x="5709556" y="4097197"/>
+            <a:ext cx="1490544" cy="307777"/>
+          </a:xfrm>
+          <a:prstGeom prst="rect">
+            <a:avLst/>
+          </a:prstGeom>
+          <a:noFill/>
+          <a:ln>
+            <a:noFill/>
+          </a:ln>
+        </p:spPr>
+        <p:txBody>
+          <a:bodyPr wrap="square" rtlCol="0" anchor="ctr" anchorCtr="1">
+            <a:spAutoFit/>
+          </a:bodyPr>
+          <a:lstStyle/>
+          <a:p>
+            <a:pPr algn="ctr"/>
+            <a:r>
+              <a:rPr lang="en-US" sz="1400" dirty="0" smtClean="0">
+                <a:solidFill>
+                  <a:schemeClr val="accent5">
+                    <a:lumMod val="20000"/>
+                    <a:lumOff val="80000"/>
+                  </a:schemeClr>
+                </a:solidFill>
+              </a:rPr>
+              <a:t>Clairvoyance</a:t>
+            </a:r>
+            <a:endParaRPr lang="en-US" sz="1400" dirty="0" smtClean="0">
+              <a:solidFill>
+                <a:schemeClr val="accent5">
+                  <a:lumMod val="20000"/>
+                  <a:lumOff val="80000"/>
+                </a:schemeClr>
+              </a:solidFill>
+            </a:endParaRPr>
+          </a:p>
+        </p:txBody>
+      </p:sp>
+      <p:sp>
+        <p:nvSpPr>
+          <p:cNvPr id="14" name="TextBox 13"/>
+          <p:cNvSpPr txBox="1"/>
+          <p:nvPr/>
+        </p:nvSpPr>
+        <p:spPr>
+          <a:xfrm>
+            <a:off x="4314874" y="3789759"/>
+            <a:ext cx="1035569" cy="523220"/>
+          </a:xfrm>
+          <a:prstGeom prst="rect">
+            <a:avLst/>
+          </a:prstGeom>
+          <a:noFill/>
+          <a:ln>
+            <a:noFill/>
+          </a:ln>
+        </p:spPr>
+        <p:txBody>
+          <a:bodyPr wrap="square" rtlCol="0" anchor="ctr" anchorCtr="1">
+            <a:spAutoFit/>
+          </a:bodyPr>
+          <a:lstStyle/>
+          <a:p>
+            <a:pPr algn="ctr"/>
+            <a:r>
+              <a:rPr lang="en-US" sz="1400" dirty="0" smtClean="0">
+                <a:solidFill>
+                  <a:schemeClr val="accent5">
+                    <a:lumMod val="20000"/>
+                    <a:lumOff val="80000"/>
+                  </a:schemeClr>
+                </a:solidFill>
+              </a:rPr>
+              <a:t>Packet Dropped</a:t>
+            </a:r>
+            <a:endParaRPr lang="en-US" sz="1400" dirty="0" smtClean="0">
+              <a:solidFill>
+                <a:schemeClr val="accent5">
+                  <a:lumMod val="20000"/>
+                  <a:lumOff val="80000"/>
+                </a:schemeClr>
+              </a:solidFill>
+            </a:endParaRPr>
+          </a:p>
+        </p:txBody>
+      </p:sp>
+      <p:sp>
+        <p:nvSpPr>
+          <p:cNvPr id="15" name="TextBox 14"/>
+          <p:cNvSpPr txBox="1"/>
+          <p:nvPr/>
+        </p:nvSpPr>
+        <p:spPr>
+          <a:xfrm>
+            <a:off x="5081436" y="2312455"/>
+            <a:ext cx="1169819" cy="523220"/>
+          </a:xfrm>
+          <a:prstGeom prst="rect">
+            <a:avLst/>
+          </a:prstGeom>
+          <a:noFill/>
+          <a:ln>
+            <a:noFill/>
+          </a:ln>
+        </p:spPr>
+        <p:txBody>
+          <a:bodyPr wrap="square" rtlCol="0" anchor="ctr" anchorCtr="1">
+            <a:spAutoFit/>
+          </a:bodyPr>
+          <a:lstStyle/>
+          <a:p>
+            <a:pPr algn="ctr"/>
+            <a:r>
+              <a:rPr lang="en-US" sz="1400" dirty="0" smtClean="0">
+                <a:solidFill>
+                  <a:schemeClr val="accent5">
+                    <a:lumMod val="20000"/>
+                    <a:lumOff val="80000"/>
+                  </a:schemeClr>
+                </a:solidFill>
+              </a:rPr>
+              <a:t>502 Bad Gateway</a:t>
+            </a:r>
+            <a:endParaRPr lang="en-US" sz="1400" dirty="0" smtClean="0">
+              <a:solidFill>
+                <a:schemeClr val="accent5">
+                  <a:lumMod val="20000"/>
+                  <a:lumOff val="80000"/>
+                </a:schemeClr>
+              </a:solidFill>
+            </a:endParaRPr>
+          </a:p>
+        </p:txBody>
+      </p:sp>
+      <p:sp>
+        <p:nvSpPr>
+          <p:cNvPr id="16" name="TextBox 15"/>
+          <p:cNvSpPr txBox="1"/>
+          <p:nvPr/>
+        </p:nvSpPr>
+        <p:spPr>
+          <a:xfrm>
+            <a:off x="4957082" y="3295025"/>
+            <a:ext cx="1490544" cy="307777"/>
+          </a:xfrm>
+          <a:prstGeom prst="rect">
+            <a:avLst/>
+          </a:prstGeom>
+          <a:noFill/>
+          <a:ln>
+            <a:noFill/>
+          </a:ln>
+        </p:spPr>
+        <p:txBody>
+          <a:bodyPr wrap="square" rtlCol="0" anchor="ctr" anchorCtr="1">
+            <a:spAutoFit/>
+          </a:bodyPr>
+          <a:lstStyle/>
+          <a:p>
+            <a:pPr algn="ctr"/>
+            <a:r>
+              <a:rPr lang="en-US" sz="1400" dirty="0" smtClean="0">
+                <a:solidFill>
+                  <a:schemeClr val="accent5">
+                    <a:lumMod val="20000"/>
+                    <a:lumOff val="80000"/>
+                  </a:schemeClr>
+                </a:solidFill>
+              </a:rPr>
+              <a:t>Aww Yeah!</a:t>
+            </a:r>
+            <a:endParaRPr lang="en-US" sz="1400" dirty="0" smtClean="0">
+              <a:solidFill>
+                <a:schemeClr val="accent5">
+                  <a:lumMod val="20000"/>
+                  <a:lumOff val="80000"/>
+                </a:schemeClr>
+              </a:solidFill>
+            </a:endParaRPr>
           </a:p>
         </p:txBody>
       </p:sp>
@@ -6816,6 +7207,13 @@
       </p:transition>
     </mc:Fallback>
   </mc:AlternateContent>
+  <p:timing>
+    <p:tnLst>
+      <p:par>
+        <p:cTn id="1" dur="indefinite" restart="never" nodeType="tmRoot"/>
+      </p:par>
+    </p:tnLst>
+  </p:timing>
 </p:sld>
 </file>
 
@@ -6885,32 +7283,66 @@
               <a:buNone/>
             </a:pPr>
             <a:r>
+              <a:rPr lang="en-US" dirty="0" err="1" smtClean="0"/>
+              <a:t>nanopb</a:t>
+            </a:r>
+            <a:r>
+              <a:rPr lang="en-US" dirty="0" smtClean="0"/>
+              <a:t> (embedded </a:t>
+            </a:r>
+            <a:r>
               <a:rPr lang="en-US" dirty="0"/>
-              <a:t>Code &amp; Slides: </a:t>
+              <a:t>C generator): </a:t>
             </a:r>
             <a:r>
               <a:rPr lang="en-US" dirty="0">
                 <a:hlinkClick r:id="rId3"/>
               </a:rPr>
-              <a:t>https://github.com/kerchen/PyOhioProtobuf</a:t>
-            </a:r>
-            <a:endParaRPr lang="en-US" dirty="0"/>
+              <a:t>https://</a:t>
+            </a:r>
+            <a:r>
+              <a:rPr lang="en-US" dirty="0" smtClean="0">
+                <a:hlinkClick r:id="rId3"/>
+              </a:rPr>
+              <a:t>github.com/nanopb/nanopb</a:t>
+            </a:r>
+            <a:endParaRPr lang="en-US" dirty="0" smtClean="0"/>
           </a:p>
           <a:p>
             <a:pPr marL="0" indent="0">
               <a:buNone/>
             </a:pPr>
             <a:r>
+              <a:rPr lang="en-US" dirty="0" smtClean="0"/>
+              <a:t>Presentation </a:t>
+            </a:r>
+            <a:r>
+              <a:rPr lang="en-US" dirty="0" smtClean="0"/>
+              <a:t>Materials: </a:t>
+            </a:r>
+            <a:r>
+              <a:rPr lang="en-US" dirty="0">
+                <a:hlinkClick r:id="rId4"/>
+              </a:rPr>
+              <a:t>https://github.com/kerchen/PyOhioProtobuf</a:t>
+            </a:r>
+            <a:endParaRPr lang="en-US" dirty="0"/>
+          </a:p>
+          <a:p>
+            <a:pPr marL="0" indent="0">
+              <a:buNone/>
+            </a:pPr>
+            <a:r>
               <a:rPr lang="en-US" dirty="0"/>
-              <a:t>Contact Paul </a:t>
-            </a:r>
-            <a:r>
-              <a:rPr lang="en-US" dirty="0" err="1"/>
-              <a:t>Kerchen</a:t>
+              <a:t>Contact </a:t>
+            </a:r>
+            <a:r>
+              <a:rPr lang="en-US" dirty="0" smtClean="0"/>
+              <a:t>Me: </a:t>
             </a:r>
             <a:r>
               <a:rPr lang="en-US" dirty="0"/>
-              <a:t>: paul@whirlingchair.com</a:t>
+              <a:t>paul@whirlingchair.com</a:t>
             </a:r>
           </a:p>
         </p:txBody>
@@ -6959,6 +7391,13 @@
       </p:transition>
     </mc:Fallback>
   </mc:AlternateContent>
+  <p:timing>
+    <p:tnLst>
+      <p:par>
+        <p:cTn id="1" dur="indefinite" restart="never" nodeType="tmRoot"/>
+      </p:par>
+    </p:tnLst>
+  </p:timing>
 </p:sld>
 </file>
 
@@ -7078,6 +7517,13 @@
       </p:transition>
     </mc:Fallback>
   </mc:AlternateContent>
+  <p:timing>
+    <p:tnLst>
+      <p:par>
+        <p:cTn id="1" dur="indefinite" restart="never" nodeType="tmRoot"/>
+      </p:par>
+    </p:tnLst>
+  </p:timing>
 </p:sld>
 </file>
 
@@ -7198,6 +7644,13 @@
       </p:transition>
     </mc:Fallback>
   </mc:AlternateContent>
+  <p:timing>
+    <p:tnLst>
+      <p:par>
+        <p:cTn id="1" dur="indefinite" restart="never" nodeType="tmRoot"/>
+      </p:par>
+    </p:tnLst>
+  </p:timing>
 </p:sld>
 </file>
 
@@ -7665,12 +8118,13 @@
           </a:bodyPr>
           <a:lstStyle/>
           <a:p>
-            <a:endParaRPr lang="en-US" dirty="0"/>
-          </a:p>
-          <a:p>
+            <a:r>
+              <a:rPr lang="en-US" dirty="0" smtClean="0"/>
+              <a:t>Most </a:t>
+            </a:r>
             <a:r>
               <a:rPr lang="en-US" dirty="0"/>
-              <a:t>Most have variable-length encoding</a:t>
+              <a:t>have variable-length encoding</a:t>
             </a:r>
           </a:p>
           <a:p>

</xml_diff>